<commit_message>
Final slides and specification for assignment 2
</commit_message>
<xml_diff>
--- a/specification_1/Specification.pptx
+++ b/specification_1/Specification.pptx
@@ -291,7 +291,7 @@
               <a:pPr>
                 <a:defRPr/>
               </a:pPr>
-              <a:t>29/04/2018</a:t>
+              <a:t>11/06/2018</a:t>
             </a:fld>
             <a:endParaRPr lang="en-GB" dirty="0"/>
           </a:p>
@@ -510,7 +510,7 @@
               <a:pPr>
                 <a:defRPr/>
               </a:pPr>
-              <a:t>29/04/2018</a:t>
+              <a:t>11/06/2018</a:t>
             </a:fld>
             <a:endParaRPr lang="en-GB"/>
           </a:p>
@@ -7927,7 +7927,11 @@
           <a:p>
             <a:r>
               <a:rPr lang="de-DE" dirty="0"/>
-              <a:t>Garching, 30.04.2018</a:t>
+              <a:t>Garching</a:t>
+            </a:r>
+            <a:r>
+              <a:rPr lang="de-DE"/>
+              <a:t>, 12.06.2018</a:t>
             </a:r>
             <a:endParaRPr dirty="0"/>
           </a:p>

</xml_diff>